<commit_message>
at this point just the music is weird, solved a lot of bugs
</commit_message>
<xml_diff>
--- a/Vectrex/projects/NeuroVector/overlay/overlay_template.pptx
+++ b/Vectrex/projects/NeuroVector/overlay/overlay_template.pptx
@@ -2944,7 +2944,7 @@
                   <a:srgbClr val="000000"/>
                 </a:solidFill>
               </a:rPr>
-              <a:t>16.06.2025</a:t>
+              <a:t>14.07.2025</a:t>
             </a:fld>
             <a:endParaRPr lang="de-DE" dirty="0">
               <a:solidFill>
@@ -3889,7 +3889,7 @@
                   <a:srgbClr val="000000"/>
                 </a:solidFill>
               </a:rPr>
-              <a:t>16.06.2025</a:t>
+              <a:t>14.07.2025</a:t>
             </a:fld>
             <a:endParaRPr lang="de-DE" dirty="0">
               <a:solidFill>
@@ -12774,7 +12774,7 @@
           <p:spPr>
             <a:xfrm>
               <a:off x="5143894" y="7814116"/>
-              <a:ext cx="958915" cy="253916"/>
+              <a:ext cx="958915" cy="276999"/>
             </a:xfrm>
             <a:prstGeom prst="rect">
               <a:avLst/>
@@ -12796,7 +12796,7 @@
             <a:p>
               <a:pPr algn="ctr"/>
               <a:r>
-                <a:rPr lang="de-DE" sz="1050" b="1" dirty="0">
+                <a:rPr lang="de-DE" sz="1200" dirty="0">
                   <a:solidFill>
                     <a:schemeClr val="bg1"/>
                   </a:solidFill>
@@ -12807,7 +12807,7 @@
                       </a:srgbClr>
                     </a:outerShdw>
                   </a:effectLst>
-                  <a:latin typeface="Arial Black" panose="020B0A04020102020204" pitchFamily="34" charset="0"/>
+                  <a:latin typeface="SPACE MISSION" panose="02000600000000000000" pitchFamily="50" charset="0"/>
                   <a:cs typeface="Aharoni" panose="02010803020104030203" pitchFamily="2" charset="-79"/>
                 </a:rPr>
                 <a:t>CONFIRM</a:t>
@@ -12824,101 +12824,7 @@
           <p:spPr>
             <a:xfrm>
               <a:off x="4184979" y="7814116"/>
-              <a:ext cx="958915" cy="253916"/>
-            </a:xfrm>
-            <a:prstGeom prst="rect">
-              <a:avLst/>
-            </a:prstGeom>
-            <a:solidFill>
-              <a:srgbClr val="00B050"/>
-            </a:solidFill>
-            <a:ln w="19050">
-              <a:solidFill>
-                <a:schemeClr val="tx1"/>
-              </a:solidFill>
-            </a:ln>
-          </p:spPr>
-          <p:txBody>
-            <a:bodyPr wrap="square" rtlCol="0">
-              <a:spAutoFit/>
-            </a:bodyPr>
-            <a:lstStyle/>
-            <a:p>
-              <a:pPr algn="ctr"/>
-              <a:endParaRPr lang="de-DE" sz="1050" b="1" dirty="0">
-                <a:solidFill>
-                  <a:schemeClr val="bg1"/>
-                </a:solidFill>
-                <a:effectLst>
-                  <a:outerShdw blurRad="38100" dist="38100" dir="2700000" algn="tl">
-                    <a:srgbClr val="000000">
-                      <a:alpha val="43137"/>
-                    </a:srgbClr>
-                  </a:outerShdw>
-                </a:effectLst>
-                <a:latin typeface="Arial Black" panose="020B0A04020102020204" pitchFamily="34" charset="0"/>
-                <a:cs typeface="Aharoni" panose="02010803020104030203" pitchFamily="2" charset="-79"/>
-              </a:endParaRPr>
-            </a:p>
-          </p:txBody>
-        </p:sp>
-        <p:sp>
-          <p:nvSpPr>
-            <p:cNvPr id="7" name="Textfeld 6"/>
-            <p:cNvSpPr txBox="1"/>
-            <p:nvPr/>
-          </p:nvSpPr>
-          <p:spPr>
-            <a:xfrm>
-              <a:off x="2267149" y="7813681"/>
-              <a:ext cx="958915" cy="253916"/>
-            </a:xfrm>
-            <a:prstGeom prst="rect">
-              <a:avLst/>
-            </a:prstGeom>
-            <a:solidFill>
-              <a:srgbClr val="00B050"/>
-            </a:solidFill>
-            <a:ln w="19050">
-              <a:solidFill>
-                <a:schemeClr val="tx1"/>
-              </a:solidFill>
-            </a:ln>
-          </p:spPr>
-          <p:txBody>
-            <a:bodyPr wrap="square" rtlCol="0">
-              <a:spAutoFit/>
-            </a:bodyPr>
-            <a:lstStyle/>
-            <a:p>
-              <a:pPr algn="ctr"/>
-              <a:endParaRPr lang="de-DE" sz="1050" b="1" dirty="0">
-                <a:solidFill>
-                  <a:schemeClr val="bg1"/>
-                </a:solidFill>
-                <a:effectLst>
-                  <a:outerShdw blurRad="38100" dist="38100" dir="2700000" algn="tl">
-                    <a:srgbClr val="000000">
-                      <a:alpha val="43137"/>
-                    </a:srgbClr>
-                  </a:outerShdw>
-                </a:effectLst>
-                <a:latin typeface="Arial Black" panose="020B0A04020102020204" pitchFamily="34" charset="0"/>
-                <a:cs typeface="Aharoni" panose="02010803020104030203" pitchFamily="2" charset="-79"/>
-              </a:endParaRPr>
-            </a:p>
-          </p:txBody>
-        </p:sp>
-        <p:sp>
-          <p:nvSpPr>
-            <p:cNvPr id="8" name="Textfeld 7"/>
-            <p:cNvSpPr txBox="1"/>
-            <p:nvPr/>
-          </p:nvSpPr>
-          <p:spPr>
-            <a:xfrm>
-              <a:off x="734656" y="7813679"/>
-              <a:ext cx="1091861" cy="261610"/>
+              <a:ext cx="958915" cy="276999"/>
             </a:xfrm>
             <a:prstGeom prst="rect">
               <a:avLst/>
@@ -12940,7 +12846,7 @@
             <a:p>
               <a:pPr algn="ctr"/>
               <a:r>
-                <a:rPr lang="de-DE" sz="1050" b="1" dirty="0">
+                <a:rPr lang="de-DE" sz="1200" dirty="0">
                   <a:solidFill>
                     <a:schemeClr val="bg1"/>
                   </a:solidFill>
@@ -12951,81 +12857,24 @@
                       </a:srgbClr>
                     </a:outerShdw>
                   </a:effectLst>
-                  <a:latin typeface="Arial Black" panose="020B0A04020102020204" pitchFamily="34" charset="0"/>
+                  <a:latin typeface="SPACE MISSION" panose="02000600000000000000" pitchFamily="50" charset="0"/>
                   <a:cs typeface="Aharoni" panose="02010803020104030203" pitchFamily="2" charset="-79"/>
                 </a:rPr>
-                <a:t>JOYSTICK</a:t>
+                <a:t>Restart</a:t>
               </a:r>
             </a:p>
           </p:txBody>
         </p:sp>
         <p:sp>
           <p:nvSpPr>
-            <p:cNvPr id="9" name="Rechteck 8"/>
-            <p:cNvSpPr/>
-            <p:nvPr/>
-          </p:nvSpPr>
-          <p:spPr bwMode="auto">
-            <a:xfrm>
-              <a:off x="1610798" y="1066600"/>
-              <a:ext cx="3636404" cy="481064"/>
-            </a:xfrm>
-            <a:prstGeom prst="rect">
-              <a:avLst/>
-            </a:prstGeom>
-            <a:solidFill>
-              <a:srgbClr val="00B050"/>
-            </a:solidFill>
-            <a:ln w="19050" cap="flat" cmpd="sng" algn="ctr">
-              <a:solidFill>
-                <a:schemeClr val="tx1"/>
-              </a:solidFill>
-              <a:prstDash val="solid"/>
-              <a:round/>
-              <a:headEnd type="none" w="med" len="med"/>
-              <a:tailEnd type="none" w="med" len="med"/>
-            </a:ln>
-            <a:effectLst/>
-          </p:spPr>
-          <p:txBody>
-            <a:bodyPr vert="horz" wrap="square" lIns="91440" tIns="45720" rIns="91440" bIns="45720" numCol="1" rtlCol="0" anchor="ctr" anchorCtr="0" compatLnSpc="1">
-              <a:prstTxWarp prst="textNoShape">
-                <a:avLst/>
-              </a:prstTxWarp>
-            </a:bodyPr>
-            <a:lstStyle/>
-            <a:p>
-              <a:pPr algn="ctr"/>
-              <a:r>
-                <a:rPr lang="de-DE" b="1" dirty="0">
-                  <a:solidFill>
-                    <a:schemeClr val="bg1"/>
-                  </a:solidFill>
-                  <a:effectLst>
-                    <a:outerShdw blurRad="38100" dist="38100" dir="2700000" algn="tl">
-                      <a:srgbClr val="000000">
-                        <a:alpha val="43137"/>
-                      </a:srgbClr>
-                    </a:outerShdw>
-                  </a:effectLst>
-                  <a:latin typeface="Arial Black" panose="020B0A04020102020204" pitchFamily="34" charset="0"/>
-                  <a:cs typeface="Aharoni" panose="02010803020104030203" pitchFamily="2" charset="-79"/>
-                </a:rPr>
-                <a:t>NEURO VECTOR</a:t>
-              </a:r>
-            </a:p>
-          </p:txBody>
-        </p:sp>
-        <p:sp>
-          <p:nvSpPr>
-            <p:cNvPr id="10" name="Textfeld 9"/>
+            <p:cNvPr id="8" name="Textfeld 7"/>
             <p:cNvSpPr txBox="1"/>
             <p:nvPr/>
           </p:nvSpPr>
           <p:spPr>
             <a:xfrm>
-              <a:off x="3226064" y="7814116"/>
-              <a:ext cx="958915" cy="253916"/>
+              <a:off x="734656" y="7813679"/>
+              <a:ext cx="1091861" cy="276999"/>
             </a:xfrm>
             <a:prstGeom prst="rect">
               <a:avLst/>
@@ -13046,7 +12895,121 @@
             <a:lstStyle/>
             <a:p>
               <a:pPr algn="ctr"/>
-              <a:endParaRPr lang="de-DE" sz="1050" b="1" dirty="0">
+              <a:r>
+                <a:rPr lang="de-DE" sz="1200" dirty="0">
+                  <a:solidFill>
+                    <a:schemeClr val="bg1"/>
+                  </a:solidFill>
+                  <a:effectLst>
+                    <a:outerShdw blurRad="38100" dist="38100" dir="2700000" algn="tl">
+                      <a:srgbClr val="000000">
+                        <a:alpha val="43137"/>
+                      </a:srgbClr>
+                    </a:outerShdw>
+                  </a:effectLst>
+                  <a:latin typeface="SPACE MISSION" panose="02000600000000000000" pitchFamily="50" charset="0"/>
+                  <a:cs typeface="Aharoni" panose="02010803020104030203" pitchFamily="2" charset="-79"/>
+                </a:rPr>
+                <a:t>JOYSTICK</a:t>
+              </a:r>
+            </a:p>
+          </p:txBody>
+        </p:sp>
+        <p:sp>
+          <p:nvSpPr>
+            <p:cNvPr id="10" name="Textfeld 9"/>
+            <p:cNvSpPr txBox="1"/>
+            <p:nvPr/>
+          </p:nvSpPr>
+          <p:spPr>
+            <a:xfrm>
+              <a:off x="3226064" y="7814116"/>
+              <a:ext cx="958915" cy="276999"/>
+            </a:xfrm>
+            <a:prstGeom prst="rect">
+              <a:avLst/>
+            </a:prstGeom>
+            <a:solidFill>
+              <a:srgbClr val="00B050"/>
+            </a:solidFill>
+            <a:ln w="19050">
+              <a:solidFill>
+                <a:schemeClr val="tx1"/>
+              </a:solidFill>
+            </a:ln>
+          </p:spPr>
+          <p:txBody>
+            <a:bodyPr wrap="square" rtlCol="0">
+              <a:spAutoFit/>
+            </a:bodyPr>
+            <a:lstStyle/>
+            <a:p>
+              <a:pPr algn="ctr"/>
+              <a:r>
+                <a:rPr lang="de-DE" sz="1200" dirty="0">
+                  <a:solidFill>
+                    <a:schemeClr val="bg1"/>
+                  </a:solidFill>
+                  <a:effectLst>
+                    <a:outerShdw blurRad="38100" dist="38100" dir="2700000" algn="tl">
+                      <a:srgbClr val="000000">
+                        <a:alpha val="43137"/>
+                      </a:srgbClr>
+                    </a:outerShdw>
+                  </a:effectLst>
+                  <a:latin typeface="SPACE MISSION" panose="02000600000000000000" pitchFamily="50" charset="0"/>
+                  <a:cs typeface="Aharoni" panose="02010803020104030203" pitchFamily="2" charset="-79"/>
+                </a:rPr>
+                <a:t>Menu</a:t>
+              </a:r>
+            </a:p>
+          </p:txBody>
+        </p:sp>
+      </p:grpSp>
+      <p:sp>
+        <p:nvSpPr>
+          <p:cNvPr id="11" name="Sechseck 10">
+            <a:extLst>
+              <a:ext uri="{FF2B5EF4-FFF2-40B4-BE49-F238E27FC236}">
+                <a16:creationId xmlns:a16="http://schemas.microsoft.com/office/drawing/2014/main" id="{55952318-06DF-88FD-9A81-43DC72C471BA}"/>
+              </a:ext>
+            </a:extLst>
+          </p:cNvPr>
+          <p:cNvSpPr/>
+          <p:nvPr/>
+        </p:nvSpPr>
+        <p:spPr bwMode="auto">
+          <a:xfrm>
+            <a:off x="1280586" y="1151620"/>
+            <a:ext cx="4452670" cy="648072"/>
+          </a:xfrm>
+          <a:prstGeom prst="hexagon">
+            <a:avLst/>
+          </a:prstGeom>
+          <a:solidFill>
+            <a:srgbClr val="00B050"/>
+          </a:solidFill>
+          <a:ln w="38100" cap="flat" cmpd="sng" algn="ctr">
+            <a:solidFill>
+              <a:schemeClr val="tx2"/>
+            </a:solidFill>
+            <a:prstDash val="solid"/>
+            <a:round/>
+            <a:headEnd type="none" w="med" len="med"/>
+            <a:tailEnd type="none" w="med" len="med"/>
+          </a:ln>
+          <a:effectLst/>
+        </p:spPr>
+        <p:txBody>
+          <a:bodyPr vert="horz" wrap="square" lIns="91440" tIns="45720" rIns="91440" bIns="45720" numCol="1" rtlCol="0" anchor="t" anchorCtr="0" compatLnSpc="1">
+            <a:prstTxWarp prst="textNoShape">
+              <a:avLst/>
+            </a:prstTxWarp>
+          </a:bodyPr>
+          <a:lstStyle/>
+          <a:p>
+            <a:r>
+              <a:rPr lang="de-DE" sz="3600" b="1" dirty="0">
                 <a:solidFill>
                   <a:schemeClr val="bg1"/>
                 </a:solidFill>
@@ -13057,13 +13020,42 @@
                     </a:srgbClr>
                   </a:outerShdw>
                 </a:effectLst>
-                <a:latin typeface="Arial Black" panose="020B0A04020102020204" pitchFamily="34" charset="0"/>
+                <a:latin typeface="SPACE MISSION" panose="02000600000000000000" pitchFamily="50" charset="0"/>
                 <a:cs typeface="Aharoni" panose="02010803020104030203" pitchFamily="2" charset="-79"/>
-              </a:endParaRPr>
-            </a:p>
-          </p:txBody>
-        </p:sp>
-      </p:grpSp>
+              </a:rPr>
+              <a:t>NEURO VECTOR</a:t>
+            </a:r>
+          </a:p>
+          <a:p>
+            <a:pPr marL="0" marR="0" indent="0" algn="l" defTabSz="914400" rtl="0" eaLnBrk="0" fontAlgn="base" latinLnBrk="0" hangingPunct="0">
+              <a:lnSpc>
+                <a:spcPct val="100000"/>
+              </a:lnSpc>
+              <a:spcBef>
+                <a:spcPct val="0"/>
+              </a:spcBef>
+              <a:spcAft>
+                <a:spcPct val="0"/>
+              </a:spcAft>
+              <a:buClrTx/>
+              <a:buSzTx/>
+              <a:buFontTx/>
+              <a:buNone/>
+              <a:tabLst/>
+            </a:pPr>
+            <a:endParaRPr kumimoji="0" lang="de-DE" sz="2000" b="0" i="0" u="none" strike="noStrike" cap="none" normalizeH="0" baseline="0" dirty="0">
+              <a:ln>
+                <a:noFill/>
+              </a:ln>
+              <a:solidFill>
+                <a:schemeClr val="tx1"/>
+              </a:solidFill>
+              <a:effectLst/>
+              <a:latin typeface="Arial" charset="0"/>
+            </a:endParaRPr>
+          </a:p>
+        </p:txBody>
+      </p:sp>
     </p:spTree>
     <p:extLst>
       <p:ext uri="{BB962C8B-B14F-4D97-AF65-F5344CB8AC3E}">

</xml_diff>